<commit_message>
adding follow up for partial proofs. adding to readme
</commit_message>
<xml_diff>
--- a/Unmasking Blockchain.pptx
+++ b/Unmasking Blockchain.pptx
@@ -229,7 +229,7 @@
           <a:p>
             <a:fld id="{762B48F5-BACC-47D6-A0F7-82FBF9C6BC85}" type="datetimeFigureOut">
               <a:rPr lang="en-US"/>
-              <a:t>2/25/2018</a:t>
+              <a:t>2/26/2018</a:t>
             </a:fld>
             <a:endParaRPr/>
           </a:p>
@@ -394,7 +394,7 @@
           <a:p>
             <a:fld id="{0CB1CD00-5424-4675-AB18-2C419B060449}" type="datetimeFigureOut">
               <a:rPr lang="en-US"/>
-              <a:t>2/25/2018</a:t>
+              <a:t>2/26/2018</a:t>
             </a:fld>
             <a:endParaRPr/>
           </a:p>
@@ -1039,7 +1039,7 @@
           <a:p>
             <a:fld id="{37CC0096-1860-4642-9CD2-0079EA5E7CD1}" type="datetimeFigureOut">
               <a:rPr lang="en-US" smtClean="0"/>
-              <a:t>2/25/2018</a:t>
+              <a:t>2/26/2018</a:t>
             </a:fld>
             <a:endParaRPr lang="en-US"/>
           </a:p>
@@ -1218,7 +1218,7 @@
           <a:p>
             <a:fld id="{37CC0096-1860-4642-9CD2-0079EA5E7CD1}" type="datetimeFigureOut">
               <a:rPr lang="en-US" smtClean="0"/>
-              <a:t>2/25/2018</a:t>
+              <a:t>2/26/2018</a:t>
             </a:fld>
             <a:endParaRPr lang="en-US"/>
           </a:p>
@@ -1391,7 +1391,7 @@
           <a:p>
             <a:fld id="{37CC0096-1860-4642-9CD2-0079EA5E7CD1}" type="datetimeFigureOut">
               <a:rPr lang="en-US" smtClean="0"/>
-              <a:t>2/25/2018</a:t>
+              <a:t>2/26/2018</a:t>
             </a:fld>
             <a:endParaRPr lang="en-US"/>
           </a:p>
@@ -1824,7 +1824,7 @@
           <a:p>
             <a:fld id="{37CC0096-1860-4642-9CD2-0079EA5E7CD1}" type="datetimeFigureOut">
               <a:rPr lang="en-US" smtClean="0"/>
-              <a:t>2/25/2018</a:t>
+              <a:t>2/26/2018</a:t>
             </a:fld>
             <a:endParaRPr lang="en-US"/>
           </a:p>
@@ -2263,7 +2263,7 @@
           <a:p>
             <a:fld id="{37CC0096-1860-4642-9CD2-0079EA5E7CD1}" type="datetimeFigureOut">
               <a:rPr lang="en-US" smtClean="0"/>
-              <a:t>2/25/2018</a:t>
+              <a:t>2/26/2018</a:t>
             </a:fld>
             <a:endParaRPr lang="en-US"/>
           </a:p>
@@ -2380,7 +2380,7 @@
           <a:p>
             <a:fld id="{37CC0096-1860-4642-9CD2-0079EA5E7CD1}" type="datetimeFigureOut">
               <a:rPr lang="en-US" smtClean="0"/>
-              <a:t>2/25/2018</a:t>
+              <a:t>2/26/2018</a:t>
             </a:fld>
             <a:endParaRPr lang="en-US"/>
           </a:p>
@@ -2475,7 +2475,7 @@
           <a:p>
             <a:fld id="{37CC0096-1860-4642-9CD2-0079EA5E7CD1}" type="datetimeFigureOut">
               <a:rPr lang="en-US" smtClean="0"/>
-              <a:t>2/25/2018</a:t>
+              <a:t>2/26/2018</a:t>
             </a:fld>
             <a:endParaRPr lang="en-US"/>
           </a:p>
@@ -2759,7 +2759,7 @@
           <a:p>
             <a:fld id="{37CC0096-1860-4642-9CD2-0079EA5E7CD1}" type="datetimeFigureOut">
               <a:rPr lang="en-US" smtClean="0"/>
-              <a:t>2/25/2018</a:t>
+              <a:t>2/26/2018</a:t>
             </a:fld>
             <a:endParaRPr lang="en-US"/>
           </a:p>
@@ -3070,7 +3070,7 @@
           <a:p>
             <a:fld id="{37CC0096-1860-4642-9CD2-0079EA5E7CD1}" type="datetimeFigureOut">
               <a:rPr lang="en-US" smtClean="0"/>
-              <a:t>2/25/2018</a:t>
+              <a:t>2/26/2018</a:t>
             </a:fld>
             <a:endParaRPr lang="en-US"/>
           </a:p>
@@ -3302,7 +3302,7 @@
             <a:fld id="{37CC0096-1860-4642-9CD2-0079EA5E7CD1}" type="datetimeFigureOut">
               <a:rPr lang="en-US" smtClean="0"/>
               <a:pPr/>
-              <a:t>2/25/2018</a:t>
+              <a:t>2/26/2018</a:t>
             </a:fld>
             <a:endParaRPr lang="en-US"/>
           </a:p>
@@ -4622,31 +4622,71 @@
               <a:rPr lang="en-US" dirty="0">
                 <a:hlinkClick r:id="rId3"/>
               </a:rPr>
-              <a:t>https://automationrhapsody.com/md5-sha-1-sha-256-sha-512-speed-performance</a:t>
-            </a:r>
-            <a:endParaRPr lang="en-US" dirty="0"/>
+              <a:t>https://</a:t>
+            </a:r>
+            <a:r>
+              <a:rPr lang="en-US" dirty="0" smtClean="0">
+                <a:hlinkClick r:id="rId3"/>
+              </a:rPr>
+              <a:t>automationrhapsody.com/md5-sha-1-sha-256-sha-512-speed-performance</a:t>
+            </a:r>
+            <a:endParaRPr lang="en-US" dirty="0" smtClean="0"/>
           </a:p>
           <a:p>
             <a:r>
               <a:rPr lang="en-US" dirty="0">
                 <a:hlinkClick r:id="rId4"/>
               </a:rPr>
-              <a:t>http://lmgtfy.com/?q=bitcoin+algorithm+computing+costs</a:t>
+              <a:t>http://lmgtfy.com/?</a:t>
+            </a:r>
+            <a:r>
+              <a:rPr lang="en-US" dirty="0" smtClean="0">
+                <a:hlinkClick r:id="rId4"/>
+              </a:rPr>
+              <a:t>q=partial+proof+of+work</a:t>
             </a:r>
             <a:endParaRPr lang="en-US" dirty="0"/>
-          </a:p>
-          <a:p>
-            <a:pPr lvl="1"/>
-            <a:r>
-              <a:rPr lang="en-US" dirty="0"/>
-              <a:t>$3,966</a:t>
-            </a:r>
           </a:p>
           <a:p>
             <a:r>
               <a:rPr lang="en-US" dirty="0">
                 <a:hlinkClick r:id="rId5"/>
               </a:rPr>
+              <a:t>http://lmgtfy.com/?q=bitcoin+algorithm+computing+costs</a:t>
+            </a:r>
+            <a:endParaRPr lang="en-US" dirty="0"/>
+          </a:p>
+          <a:p>
+            <a:pPr lvl="1"/>
+            <a:r>
+              <a:rPr lang="en-US" dirty="0"/>
+              <a:t>$</a:t>
+            </a:r>
+            <a:r>
+              <a:rPr lang="en-US" dirty="0" smtClean="0"/>
+              <a:t>3,966</a:t>
+            </a:r>
+          </a:p>
+          <a:p>
+            <a:r>
+              <a:rPr lang="en-US" dirty="0">
+                <a:hlinkClick r:id="rId6"/>
+              </a:rPr>
+              <a:t>http://lmgtfy.com/?</a:t>
+            </a:r>
+            <a:r>
+              <a:rPr lang="en-US" dirty="0" smtClean="0">
+                <a:hlinkClick r:id="rId6"/>
+              </a:rPr>
+              <a:t>q=event+sourcing</a:t>
+            </a:r>
+            <a:endParaRPr lang="en-US" dirty="0"/>
+          </a:p>
+          <a:p>
+            <a:r>
+              <a:rPr lang="en-US" dirty="0">
+                <a:hlinkClick r:id="rId7"/>
+              </a:rPr>
               <a:t>http://lmgtfy.com/?q=bitcoin+mining+legislation</a:t>
             </a:r>
             <a:endParaRPr lang="en-US" dirty="0"/>
@@ -4658,7 +4698,7 @@
             </a:r>
             <a:r>
               <a:rPr lang="en-US" dirty="0">
-                <a:hlinkClick r:id="rId6"/>
+                <a:hlinkClick r:id="rId8"/>
               </a:rPr>
               <a:t>http://lmgtfy.com/?q=future+of+distributed+ledger+technology</a:t>
             </a:r>
@@ -7449,6 +7489,15 @@
 </file>
 
 <file path=customXml/item1.xml><?xml version="1.0" encoding="utf-8"?>
+<?mso-contentType ?>
+<FormTemplates xmlns="http://schemas.microsoft.com/sharepoint/v3/contenttype/forms">
+  <Display>DocumentLibraryForm</Display>
+  <Edit>AssetEditForm</Edit>
+  <New>DocumentLibraryForm</New>
+</FormTemplates>
+</file>
+
+<file path=customXml/item2.xml><?xml version="1.0" encoding="utf-8"?>
 <ct:contentTypeSchema xmlns:ct="http://schemas.microsoft.com/office/2006/metadata/contentType" xmlns:ma="http://schemas.microsoft.com/office/2006/metadata/properties/metaAttributes" ct:_="" ma:_="" ma:contentTypeName="TemplateFile" ma:contentTypeID="0x0101006EDDDB5EE6D98C44930B742096920B300400F5B6D36B3EF94B4E9A635CDF2A18F5B8" ma:contentTypeVersion="72" ma:contentTypeDescription="Create a new document." ma:contentTypeScope="" ma:versionID="a23e56308344d904b51738559c3d67c9">
   <xsd:schema xmlns:xsd="http://www.w3.org/2001/XMLSchema" xmlns:xs="http://www.w3.org/2001/XMLSchema" xmlns:p="http://schemas.microsoft.com/office/2006/metadata/properties" xmlns:ns2="4873beb7-5857-4685-be1f-d57550cc96cc" targetNamespace="http://schemas.microsoft.com/office/2006/metadata/properties" ma:root="true" ma:fieldsID="cd0908cc4600e77bf5da051303e00c8d" ns2:_="">
     <xsd:import namespace="4873beb7-5857-4685-be1f-d57550cc96cc"/>
@@ -8488,15 +8537,6 @@
 </ct:contentTypeSchema>
 </file>
 
-<file path=customXml/item2.xml><?xml version="1.0" encoding="utf-8"?>
-<?mso-contentType ?>
-<FormTemplates xmlns="http://schemas.microsoft.com/sharepoint/v3/contenttype/forms">
-  <Display>DocumentLibraryForm</Display>
-  <Edit>AssetEditForm</Edit>
-  <New>DocumentLibraryForm</New>
-</FormTemplates>
-</file>
-
 <file path=customXml/item3.xml><?xml version="1.0" encoding="utf-8"?>
 <p:properties xmlns:p="http://schemas.microsoft.com/office/2006/metadata/properties" xmlns:xsi="http://www.w3.org/2001/XMLSchema-instance" xmlns:pc="http://schemas.microsoft.com/office/infopath/2007/PartnerControls">
   <documentManagement>
@@ -8624,6 +8664,14 @@
 </file>
 
 <file path=customXml/itemProps1.xml><?xml version="1.0" encoding="utf-8"?>
+<ds:datastoreItem xmlns:ds="http://schemas.openxmlformats.org/officeDocument/2006/customXml" ds:itemID="{746CFF6F-D9AA-4BC0-911A-0A1356771912}">
+  <ds:schemaRefs>
+    <ds:schemaRef ds:uri="http://schemas.microsoft.com/sharepoint/v3/contenttype/forms"/>
+  </ds:schemaRefs>
+</ds:datastoreItem>
+</file>
+
+<file path=customXml/itemProps2.xml><?xml version="1.0" encoding="utf-8"?>
 <ds:datastoreItem xmlns:ds="http://schemas.openxmlformats.org/officeDocument/2006/customXml" ds:itemID="{0B5C6E15-39DC-470B-9445-F754B9458020}">
   <ds:schemaRefs>
     <ds:schemaRef ds:uri="http://schemas.microsoft.com/office/2006/metadata/contentType"/>
@@ -8637,14 +8685,6 @@
     <ds:schemaRef ds:uri="http://purl.org/dc/elements/1.1/"/>
     <ds:schemaRef ds:uri="http://purl.org/dc/terms/"/>
     <ds:schemaRef ds:uri="http://schemas.microsoft.com/internal/obd"/>
-  </ds:schemaRefs>
-</ds:datastoreItem>
-</file>
-
-<file path=customXml/itemProps2.xml><?xml version="1.0" encoding="utf-8"?>
-<ds:datastoreItem xmlns:ds="http://schemas.openxmlformats.org/officeDocument/2006/customXml" ds:itemID="{746CFF6F-D9AA-4BC0-911A-0A1356771912}">
-  <ds:schemaRefs>
-    <ds:schemaRef ds:uri="http://schemas.microsoft.com/sharepoint/v3/contenttype/forms"/>
   </ds:schemaRefs>
 </ds:datastoreItem>
 </file>

</xml_diff>